<commit_message>
add more to clone
</commit_message>
<xml_diff>
--- a/Presentation1.pptx
+++ b/Presentation1.pptx
@@ -4424,7 +4424,15 @@
           <a:bodyPr/>
           <a:lstStyle/>
           <a:p>
-            <a:endParaRPr lang="en-US"/>
+            <a:r>
+              <a:rPr lang="en-US" dirty="0"/>
+              <a:t>Git clone &lt;repo URL&gt;: used to make a clone of a repo from </a:t>
+            </a:r>
+            <a:r>
+              <a:rPr lang="en-US" dirty="0" err="1"/>
+              <a:t>github</a:t>
+            </a:r>
+            <a:endParaRPr lang="en-US" dirty="0"/>
           </a:p>
         </p:txBody>
       </p:sp>

</xml_diff>